<commit_message>
fix typos, ch 5, 6, 8
</commit_message>
<xml_diff>
--- a/CYBER360-5.3-Windows-APIs.pptx
+++ b/CYBER360-5.3-Windows-APIs.pptx
@@ -425,7 +425,7 @@
           <a:p>
             <a:fld id="{71087A05-F855-4434-8DDE-39A8542098A6}" type="datetimeFigureOut">
               <a:rPr lang="en-US" smtClean="0"/>
-              <a:t>11/21/2024</a:t>
+              <a:t>2/11/2025</a:t>
             </a:fld>
             <a:endParaRPr lang="en-US"/>
           </a:p>
@@ -663,7 +663,7 @@
           <a:p>
             <a:fld id="{71087A05-F855-4434-8DDE-39A8542098A6}" type="datetimeFigureOut">
               <a:rPr lang="en-US" smtClean="0"/>
-              <a:t>11/21/2024</a:t>
+              <a:t>2/11/2025</a:t>
             </a:fld>
             <a:endParaRPr lang="en-US"/>
           </a:p>
@@ -899,7 +899,7 @@
           <a:p>
             <a:fld id="{421996D4-4A1C-4BBC-AA2B-FD5B7FC395A0}" type="datetime1">
               <a:rPr lang="en-US" smtClean="0"/>
-              <a:t>11/21/2024</a:t>
+              <a:t>2/11/2025</a:t>
             </a:fld>
             <a:endParaRPr lang="en-US"/>
           </a:p>
@@ -1202,7 +1202,7 @@
           <a:p>
             <a:fld id="{71087A05-F855-4434-8DDE-39A8542098A6}" type="datetimeFigureOut">
               <a:rPr lang="en-US" smtClean="0"/>
-              <a:t>11/21/2024</a:t>
+              <a:t>2/11/2025</a:t>
             </a:fld>
             <a:endParaRPr lang="en-US"/>
           </a:p>
@@ -1507,7 +1507,7 @@
           <a:p>
             <a:fld id="{71087A05-F855-4434-8DDE-39A8542098A6}" type="datetimeFigureOut">
               <a:rPr lang="en-US" smtClean="0"/>
-              <a:t>11/21/2024</a:t>
+              <a:t>2/11/2025</a:t>
             </a:fld>
             <a:endParaRPr lang="en-US"/>
           </a:p>
@@ -1810,7 +1810,7 @@
           <a:p>
             <a:fld id="{71087A05-F855-4434-8DDE-39A8542098A6}" type="datetimeFigureOut">
               <a:rPr lang="en-US" smtClean="0"/>
-              <a:t>11/21/2024</a:t>
+              <a:t>2/11/2025</a:t>
             </a:fld>
             <a:endParaRPr lang="en-US"/>
           </a:p>
@@ -2261,7 +2261,7 @@
           <a:p>
             <a:fld id="{71087A05-F855-4434-8DDE-39A8542098A6}" type="datetimeFigureOut">
               <a:rPr lang="en-US" smtClean="0"/>
-              <a:t>11/21/2024</a:t>
+              <a:t>2/11/2025</a:t>
             </a:fld>
             <a:endParaRPr lang="en-US"/>
           </a:p>
@@ -2434,7 +2434,7 @@
           <a:p>
             <a:fld id="{71087A05-F855-4434-8DDE-39A8542098A6}" type="datetimeFigureOut">
               <a:rPr lang="en-US" smtClean="0"/>
-              <a:t>11/21/2024</a:t>
+              <a:t>2/11/2025</a:t>
             </a:fld>
             <a:endParaRPr lang="en-US"/>
           </a:p>
@@ -2571,7 +2571,7 @@
           <a:p>
             <a:fld id="{71087A05-F855-4434-8DDE-39A8542098A6}" type="datetimeFigureOut">
               <a:rPr lang="en-US" smtClean="0"/>
-              <a:t>11/21/2024</a:t>
+              <a:t>2/11/2025</a:t>
             </a:fld>
             <a:endParaRPr lang="en-US"/>
           </a:p>
@@ -2915,7 +2915,7 @@
           <a:p>
             <a:fld id="{71087A05-F855-4434-8DDE-39A8542098A6}" type="datetimeFigureOut">
               <a:rPr lang="en-US" smtClean="0"/>
-              <a:t>11/21/2024</a:t>
+              <a:t>2/11/2025</a:t>
             </a:fld>
             <a:endParaRPr lang="en-US"/>
           </a:p>
@@ -3239,7 +3239,7 @@
           <a:p>
             <a:fld id="{71087A05-F855-4434-8DDE-39A8542098A6}" type="datetimeFigureOut">
               <a:rPr lang="en-US" smtClean="0"/>
-              <a:t>11/21/2024</a:t>
+              <a:t>2/11/2025</a:t>
             </a:fld>
             <a:endParaRPr lang="en-US"/>
           </a:p>
@@ -10911,7 +10911,7 @@
                         <a:latin typeface="Arial"/>
                         <a:cs typeface="Arial" pitchFamily="34" charset="0"/>
                       </a:rPr>
-                      <a:t>.WinRT</a:t>
+                      <a:t>WinRT</a:t>
                     </a:r>
                     <a:endParaRPr kumimoji="0" lang="ko-KR" altLang="en-US" sz="1400" b="0" i="0" u="none" strike="noStrike" kern="1200" cap="none" spc="0" normalizeH="0" baseline="0" noProof="0" dirty="0">
                       <a:ln>
@@ -11372,12 +11372,8 @@
                 <a:buChar char="•"/>
               </a:pPr>
               <a:r>
-                <a:rPr lang="en-US" dirty="0" err="1"/>
-                <a:t>Sofware</a:t>
-              </a:r>
-              <a:r>
                 <a:rPr lang="en-US" dirty="0"/>
-                <a:t> development kits (SDKs)</a:t>
+                <a:t>Software development kits (SDKs)</a:t>
               </a:r>
             </a:p>
           </p:txBody>
@@ -11819,15 +11815,7 @@
             </a:pPr>
             <a:r>
               <a:rPr lang="en-US" dirty="0"/>
-              <a:t>It’s bundled with Windows </a:t>
-            </a:r>
-            <a:r>
-              <a:rPr lang="en-US" dirty="0" err="1"/>
-              <a:t>Powershell</a:t>
-            </a:r>
-            <a:r>
-              <a:rPr lang="en-US" dirty="0"/>
-              <a:t> (Desktop edition, version 5.1).</a:t>
+              <a:t>It’s bundled with Windows PowerShell (Desktop edition, version 5.1).</a:t>
             </a:r>
           </a:p>
           <a:p>
@@ -11844,7 +11832,15 @@
             </a:pPr>
             <a:r>
               <a:rPr lang="en-US" dirty="0"/>
-              <a:t>On a Windows 10 workstation its path is:</a:t>
+              <a:t>On a </a:t>
+            </a:r>
+            <a:r>
+              <a:rPr lang="en-US"/>
+              <a:t>Windows 11 </a:t>
+            </a:r>
+            <a:r>
+              <a:rPr lang="en-US" dirty="0"/>
+              <a:t>workstation its path is:</a:t>
             </a:r>
           </a:p>
           <a:p>

</xml_diff>